<commit_message>
adding lab, tip (hint) for ok bottom [improve the game control]
pending:   complete the initial game setting for player card dick
</commit_message>
<xml_diff>
--- a/New folder/img/player pawn design.pptx
+++ b/New folder/img/player pawn design.pptx
@@ -261,7 +261,7 @@
           <a:p>
             <a:fld id="{3D1FD20C-133E-4569-A427-F8F5F61D6F00}" type="datetimeFigureOut">
               <a:rPr lang="en-CA" smtClean="0"/>
-              <a:t>2020-03-27</a:t>
+              <a:t>2020-04-04</a:t>
             </a:fld>
             <a:endParaRPr lang="en-CA"/>
           </a:p>
@@ -461,7 +461,7 @@
           <a:p>
             <a:fld id="{3D1FD20C-133E-4569-A427-F8F5F61D6F00}" type="datetimeFigureOut">
               <a:rPr lang="en-CA" smtClean="0"/>
-              <a:t>2020-03-27</a:t>
+              <a:t>2020-04-04</a:t>
             </a:fld>
             <a:endParaRPr lang="en-CA"/>
           </a:p>
@@ -671,7 +671,7 @@
           <a:p>
             <a:fld id="{3D1FD20C-133E-4569-A427-F8F5F61D6F00}" type="datetimeFigureOut">
               <a:rPr lang="en-CA" smtClean="0"/>
-              <a:t>2020-03-27</a:t>
+              <a:t>2020-04-04</a:t>
             </a:fld>
             <a:endParaRPr lang="en-CA"/>
           </a:p>
@@ -871,7 +871,7 @@
           <a:p>
             <a:fld id="{3D1FD20C-133E-4569-A427-F8F5F61D6F00}" type="datetimeFigureOut">
               <a:rPr lang="en-CA" smtClean="0"/>
-              <a:t>2020-03-27</a:t>
+              <a:t>2020-04-04</a:t>
             </a:fld>
             <a:endParaRPr lang="en-CA"/>
           </a:p>
@@ -1147,7 +1147,7 @@
           <a:p>
             <a:fld id="{3D1FD20C-133E-4569-A427-F8F5F61D6F00}" type="datetimeFigureOut">
               <a:rPr lang="en-CA" smtClean="0"/>
-              <a:t>2020-03-27</a:t>
+              <a:t>2020-04-04</a:t>
             </a:fld>
             <a:endParaRPr lang="en-CA"/>
           </a:p>
@@ -1415,7 +1415,7 @@
           <a:p>
             <a:fld id="{3D1FD20C-133E-4569-A427-F8F5F61D6F00}" type="datetimeFigureOut">
               <a:rPr lang="en-CA" smtClean="0"/>
-              <a:t>2020-03-27</a:t>
+              <a:t>2020-04-04</a:t>
             </a:fld>
             <a:endParaRPr lang="en-CA"/>
           </a:p>
@@ -1830,7 +1830,7 @@
           <a:p>
             <a:fld id="{3D1FD20C-133E-4569-A427-F8F5F61D6F00}" type="datetimeFigureOut">
               <a:rPr lang="en-CA" smtClean="0"/>
-              <a:t>2020-03-27</a:t>
+              <a:t>2020-04-04</a:t>
             </a:fld>
             <a:endParaRPr lang="en-CA"/>
           </a:p>
@@ -1972,7 +1972,7 @@
           <a:p>
             <a:fld id="{3D1FD20C-133E-4569-A427-F8F5F61D6F00}" type="datetimeFigureOut">
               <a:rPr lang="en-CA" smtClean="0"/>
-              <a:t>2020-03-27</a:t>
+              <a:t>2020-04-04</a:t>
             </a:fld>
             <a:endParaRPr lang="en-CA"/>
           </a:p>
@@ -2085,7 +2085,7 @@
           <a:p>
             <a:fld id="{3D1FD20C-133E-4569-A427-F8F5F61D6F00}" type="datetimeFigureOut">
               <a:rPr lang="en-CA" smtClean="0"/>
-              <a:t>2020-03-27</a:t>
+              <a:t>2020-04-04</a:t>
             </a:fld>
             <a:endParaRPr lang="en-CA"/>
           </a:p>
@@ -2398,7 +2398,7 @@
           <a:p>
             <a:fld id="{3D1FD20C-133E-4569-A427-F8F5F61D6F00}" type="datetimeFigureOut">
               <a:rPr lang="en-CA" smtClean="0"/>
-              <a:t>2020-03-27</a:t>
+              <a:t>2020-04-04</a:t>
             </a:fld>
             <a:endParaRPr lang="en-CA"/>
           </a:p>
@@ -2687,7 +2687,7 @@
           <a:p>
             <a:fld id="{3D1FD20C-133E-4569-A427-F8F5F61D6F00}" type="datetimeFigureOut">
               <a:rPr lang="en-CA" smtClean="0"/>
-              <a:t>2020-03-27</a:t>
+              <a:t>2020-04-04</a:t>
             </a:fld>
             <a:endParaRPr lang="en-CA"/>
           </a:p>
@@ -2930,7 +2930,7 @@
           <a:p>
             <a:fld id="{3D1FD20C-133E-4569-A427-F8F5F61D6F00}" type="datetimeFigureOut">
               <a:rPr lang="en-CA" smtClean="0"/>
-              <a:t>2020-03-27</a:t>
+              <a:t>2020-04-04</a:t>
             </a:fld>
             <a:endParaRPr lang="en-CA"/>
           </a:p>
@@ -5340,7 +5340,7 @@
         </p:nvSpPr>
         <p:spPr>
           <a:xfrm rot="16200000">
-            <a:off x="5574188" y="3024135"/>
+            <a:off x="6039603" y="845664"/>
             <a:ext cx="2401567" cy="1367464"/>
           </a:xfrm>
           <a:prstGeom prst="roundRect">
@@ -5502,7 +5502,7 @@
         </p:nvSpPr>
         <p:spPr>
           <a:xfrm rot="16200000">
-            <a:off x="3636812" y="3074402"/>
+            <a:off x="3704991" y="1823351"/>
             <a:ext cx="2401567" cy="1367464"/>
           </a:xfrm>
           <a:prstGeom prst="roundRect">
@@ -5557,6 +5557,154 @@
           </a:p>
         </p:txBody>
       </p:sp>
+      <p:grpSp>
+        <p:nvGrpSpPr>
+          <p:cNvPr id="3" name="Group 2">
+            <a:extLst>
+              <a:ext uri="{FF2B5EF4-FFF2-40B4-BE49-F238E27FC236}">
+                <a16:creationId xmlns:a16="http://schemas.microsoft.com/office/drawing/2014/main" id="{38263287-D790-4068-81BD-41A4664224D8}"/>
+              </a:ext>
+            </a:extLst>
+          </p:cNvPr>
+          <p:cNvGrpSpPr/>
+          <p:nvPr/>
+        </p:nvGrpSpPr>
+        <p:grpSpPr>
+          <a:xfrm>
+            <a:off x="5412179" y="4770997"/>
+            <a:ext cx="1367642" cy="1371942"/>
+            <a:chOff x="5412179" y="4770997"/>
+            <a:chExt cx="1367642" cy="1371942"/>
+          </a:xfrm>
+          <a:solidFill>
+            <a:schemeClr val="bg1"/>
+          </a:solidFill>
+        </p:grpSpPr>
+        <p:sp>
+          <p:nvSpPr>
+            <p:cNvPr id="35" name="Frame 34">
+              <a:extLst>
+                <a:ext uri="{FF2B5EF4-FFF2-40B4-BE49-F238E27FC236}">
+                  <a16:creationId xmlns:a16="http://schemas.microsoft.com/office/drawing/2014/main" id="{AA862EC2-3473-440C-A2C9-1C8FE2CEC0DC}"/>
+                </a:ext>
+              </a:extLst>
+            </p:cNvPr>
+            <p:cNvSpPr/>
+            <p:nvPr/>
+          </p:nvSpPr>
+          <p:spPr>
+            <a:xfrm>
+              <a:off x="5412357" y="4775475"/>
+              <a:ext cx="1367464" cy="1367464"/>
+            </a:xfrm>
+            <a:prstGeom prst="frame">
+              <a:avLst>
+                <a:gd name="adj1" fmla="val 20283"/>
+              </a:avLst>
+            </a:prstGeom>
+            <a:grpFill/>
+            <a:ln w="57150" cap="flat" cmpd="sng" algn="ctr">
+              <a:solidFill>
+                <a:schemeClr val="dk1"/>
+              </a:solidFill>
+              <a:prstDash val="solid"/>
+              <a:round/>
+              <a:headEnd type="none" w="med" len="med"/>
+              <a:tailEnd type="none" w="med" len="med"/>
+            </a:ln>
+          </p:spPr>
+          <p:style>
+            <a:lnRef idx="0">
+              <a:scrgbClr r="0" g="0" b="0"/>
+            </a:lnRef>
+            <a:fillRef idx="0">
+              <a:scrgbClr r="0" g="0" b="0"/>
+            </a:fillRef>
+            <a:effectRef idx="0">
+              <a:scrgbClr r="0" g="0" b="0"/>
+            </a:effectRef>
+            <a:fontRef idx="minor">
+              <a:schemeClr val="dk1"/>
+            </a:fontRef>
+          </p:style>
+          <p:txBody>
+            <a:bodyPr rtlCol="0" anchor="ctr"/>
+            <a:lstStyle/>
+            <a:p>
+              <a:pPr algn="ctr"/>
+              <a:endParaRPr lang="en-CA">
+                <a:solidFill>
+                  <a:schemeClr val="tx1"/>
+                </a:solidFill>
+              </a:endParaRPr>
+            </a:p>
+          </p:txBody>
+        </p:sp>
+        <p:sp>
+          <p:nvSpPr>
+            <p:cNvPr id="52" name="Frame 51">
+              <a:extLst>
+                <a:ext uri="{FF2B5EF4-FFF2-40B4-BE49-F238E27FC236}">
+                  <a16:creationId xmlns:a16="http://schemas.microsoft.com/office/drawing/2014/main" id="{35E5F19F-FAFB-4154-BAC9-BEA5E85EF3C0}"/>
+                </a:ext>
+              </a:extLst>
+            </p:cNvPr>
+            <p:cNvSpPr/>
+            <p:nvPr/>
+          </p:nvSpPr>
+          <p:spPr>
+            <a:xfrm rot="2687567">
+              <a:off x="5412179" y="4770997"/>
+              <a:ext cx="1367464" cy="1367464"/>
+            </a:xfrm>
+            <a:prstGeom prst="frame">
+              <a:avLst>
+                <a:gd name="adj1" fmla="val 20283"/>
+              </a:avLst>
+            </a:prstGeom>
+            <a:solidFill>
+              <a:schemeClr val="bg1">
+                <a:lumMod val="85000"/>
+              </a:schemeClr>
+            </a:solidFill>
+            <a:ln w="38100" cap="flat" cmpd="sng" algn="ctr">
+              <a:solidFill>
+                <a:schemeClr val="dk1"/>
+              </a:solidFill>
+              <a:prstDash val="solid"/>
+              <a:round/>
+              <a:headEnd type="none" w="med" len="med"/>
+              <a:tailEnd type="none" w="med" len="med"/>
+            </a:ln>
+          </p:spPr>
+          <p:style>
+            <a:lnRef idx="0">
+              <a:scrgbClr r="0" g="0" b="0"/>
+            </a:lnRef>
+            <a:fillRef idx="0">
+              <a:scrgbClr r="0" g="0" b="0"/>
+            </a:fillRef>
+            <a:effectRef idx="0">
+              <a:scrgbClr r="0" g="0" b="0"/>
+            </a:effectRef>
+            <a:fontRef idx="minor">
+              <a:schemeClr val="dk1"/>
+            </a:fontRef>
+          </p:style>
+          <p:txBody>
+            <a:bodyPr rtlCol="0" anchor="ctr"/>
+            <a:lstStyle/>
+            <a:p>
+              <a:pPr algn="ctr"/>
+              <a:endParaRPr lang="en-CA">
+                <a:solidFill>
+                  <a:schemeClr val="tx1"/>
+                </a:solidFill>
+              </a:endParaRPr>
+            </a:p>
+          </p:txBody>
+        </p:sp>
+      </p:grpSp>
     </p:spTree>
     <p:extLst>
       <p:ext uri="{BB962C8B-B14F-4D97-AF65-F5344CB8AC3E}">

</xml_diff>